<commit_message>
Syncing work and updates
</commit_message>
<xml_diff>
--- a/figs/slides/Testing Wavelet Denoising.pptx
+++ b/figs/slides/Testing Wavelet Denoising.pptx
@@ -15,6 +15,11 @@
     <p:sldId id="335" r:id="rId9"/>
     <p:sldId id="336" r:id="rId10"/>
     <p:sldId id="256" r:id="rId11"/>
+    <p:sldId id="339" r:id="rId12"/>
+    <p:sldId id="337" r:id="rId13"/>
+    <p:sldId id="338" r:id="rId14"/>
+    <p:sldId id="340" r:id="rId15"/>
+    <p:sldId id="341" r:id="rId16"/>
   </p:sldIdLst>
   <p:sldSz cx="12192000" cy="6858000"/>
   <p:notesSz cx="6858000" cy="9144000"/>
@@ -113,6 +118,11 @@
       </a:defRPr>
     </a:lvl9pPr>
   </p:defaultTextStyle>
+  <p:extLst>
+    <p:ext uri="{EFAFB233-063F-42B5-8137-9DF3F51BA10A}">
+      <p15:sldGuideLst xmlns:p15="http://schemas.microsoft.com/office/powerpoint/2012/main"/>
+    </p:ext>
+  </p:extLst>
 </p:presentation>
 </file>
 
@@ -263,7 +273,7 @@
           <a:p>
             <a:fld id="{F39BB6FD-2211-5D4A-AEBF-93E910322E77}" type="datetimeFigureOut">
               <a:rPr lang="en-US" smtClean="0"/>
-              <a:t>9/28/20</a:t>
+              <a:t>10/19/20</a:t>
             </a:fld>
             <a:endParaRPr lang="en-US"/>
           </a:p>
@@ -461,7 +471,7 @@
           <a:p>
             <a:fld id="{F39BB6FD-2211-5D4A-AEBF-93E910322E77}" type="datetimeFigureOut">
               <a:rPr lang="en-US" smtClean="0"/>
-              <a:t>9/28/20</a:t>
+              <a:t>10/19/20</a:t>
             </a:fld>
             <a:endParaRPr lang="en-US"/>
           </a:p>
@@ -669,7 +679,7 @@
           <a:p>
             <a:fld id="{F39BB6FD-2211-5D4A-AEBF-93E910322E77}" type="datetimeFigureOut">
               <a:rPr lang="en-US" smtClean="0"/>
-              <a:t>9/28/20</a:t>
+              <a:t>10/19/20</a:t>
             </a:fld>
             <a:endParaRPr lang="en-US"/>
           </a:p>
@@ -867,7 +877,7 @@
           <a:p>
             <a:fld id="{F39BB6FD-2211-5D4A-AEBF-93E910322E77}" type="datetimeFigureOut">
               <a:rPr lang="en-US" smtClean="0"/>
-              <a:t>9/28/20</a:t>
+              <a:t>10/19/20</a:t>
             </a:fld>
             <a:endParaRPr lang="en-US"/>
           </a:p>
@@ -1142,7 +1152,7 @@
           <a:p>
             <a:fld id="{F39BB6FD-2211-5D4A-AEBF-93E910322E77}" type="datetimeFigureOut">
               <a:rPr lang="en-US" smtClean="0"/>
-              <a:t>9/28/20</a:t>
+              <a:t>10/19/20</a:t>
             </a:fld>
             <a:endParaRPr lang="en-US"/>
           </a:p>
@@ -1407,7 +1417,7 @@
           <a:p>
             <a:fld id="{F39BB6FD-2211-5D4A-AEBF-93E910322E77}" type="datetimeFigureOut">
               <a:rPr lang="en-US" smtClean="0"/>
-              <a:t>9/28/20</a:t>
+              <a:t>10/19/20</a:t>
             </a:fld>
             <a:endParaRPr lang="en-US"/>
           </a:p>
@@ -1819,7 +1829,7 @@
           <a:p>
             <a:fld id="{F39BB6FD-2211-5D4A-AEBF-93E910322E77}" type="datetimeFigureOut">
               <a:rPr lang="en-US" smtClean="0"/>
-              <a:t>9/28/20</a:t>
+              <a:t>10/19/20</a:t>
             </a:fld>
             <a:endParaRPr lang="en-US"/>
           </a:p>
@@ -1960,7 +1970,7 @@
           <a:p>
             <a:fld id="{F39BB6FD-2211-5D4A-AEBF-93E910322E77}" type="datetimeFigureOut">
               <a:rPr lang="en-US" smtClean="0"/>
-              <a:t>9/28/20</a:t>
+              <a:t>10/19/20</a:t>
             </a:fld>
             <a:endParaRPr lang="en-US"/>
           </a:p>
@@ -2073,7 +2083,7 @@
           <a:p>
             <a:fld id="{F39BB6FD-2211-5D4A-AEBF-93E910322E77}" type="datetimeFigureOut">
               <a:rPr lang="en-US" smtClean="0"/>
-              <a:t>9/28/20</a:t>
+              <a:t>10/19/20</a:t>
             </a:fld>
             <a:endParaRPr lang="en-US"/>
           </a:p>
@@ -2384,7 +2394,7 @@
           <a:p>
             <a:fld id="{F39BB6FD-2211-5D4A-AEBF-93E910322E77}" type="datetimeFigureOut">
               <a:rPr lang="en-US" smtClean="0"/>
-              <a:t>9/28/20</a:t>
+              <a:t>10/19/20</a:t>
             </a:fld>
             <a:endParaRPr lang="en-US"/>
           </a:p>
@@ -2672,7 +2682,7 @@
           <a:p>
             <a:fld id="{F39BB6FD-2211-5D4A-AEBF-93E910322E77}" type="datetimeFigureOut">
               <a:rPr lang="en-US" smtClean="0"/>
-              <a:t>9/28/20</a:t>
+              <a:t>10/19/20</a:t>
             </a:fld>
             <a:endParaRPr lang="en-US"/>
           </a:p>
@@ -2913,7 +2923,7 @@
           <a:p>
             <a:fld id="{F39BB6FD-2211-5D4A-AEBF-93E910322E77}" type="datetimeFigureOut">
               <a:rPr lang="en-US" smtClean="0"/>
-              <a:t>9/28/20</a:t>
+              <a:t>10/19/20</a:t>
             </a:fld>
             <a:endParaRPr lang="en-US"/>
           </a:p>
@@ -3425,7 +3435,10 @@
           <a:bodyPr/>
           <a:lstStyle/>
           <a:p>
-            <a:endParaRPr lang="en-US"/>
+            <a:r>
+              <a:rPr lang="en-US" dirty="0"/>
+              <a:t>Sanity Checks/ Function Outputs</a:t>
+            </a:r>
           </a:p>
         </p:txBody>
       </p:sp>
@@ -3450,7 +3463,7 @@
           <a:bodyPr/>
           <a:lstStyle/>
           <a:p>
-            <a:endParaRPr lang="en-US"/>
+            <a:endParaRPr lang="en-US" dirty="0"/>
           </a:p>
         </p:txBody>
       </p:sp>
@@ -3458,6 +3471,1097 @@
     <p:extLst>
       <p:ext uri="{BB962C8B-B14F-4D97-AF65-F5344CB8AC3E}">
         <p14:creationId xmlns:p14="http://schemas.microsoft.com/office/powerpoint/2010/main" val="4196978115"/>
+      </p:ext>
+    </p:extLst>
+  </p:cSld>
+  <p:clrMapOvr>
+    <a:masterClrMapping/>
+  </p:clrMapOvr>
+</p:sld>
+</file>
+
+<file path=ppt/slides/slide11.xml><?xml version="1.0" encoding="utf-8"?>
+<p:sld xmlns:a="http://schemas.openxmlformats.org/drawingml/2006/main" xmlns:r="http://schemas.openxmlformats.org/officeDocument/2006/relationships" xmlns:p="http://schemas.openxmlformats.org/presentationml/2006/main">
+  <p:cSld>
+    <p:spTree>
+      <p:nvGrpSpPr>
+        <p:cNvPr id="1" name=""/>
+        <p:cNvGrpSpPr/>
+        <p:nvPr/>
+      </p:nvGrpSpPr>
+      <p:grpSpPr>
+        <a:xfrm>
+          <a:off x="0" y="0"/>
+          <a:ext cx="0" cy="0"/>
+          <a:chOff x="0" y="0"/>
+          <a:chExt cx="0" cy="0"/>
+        </a:xfrm>
+      </p:grpSpPr>
+      <p:sp>
+        <p:nvSpPr>
+          <p:cNvPr id="2" name="Title 1">
+            <a:extLst>
+              <a:ext uri="{FF2B5EF4-FFF2-40B4-BE49-F238E27FC236}">
+                <a16:creationId xmlns:a16="http://schemas.microsoft.com/office/drawing/2014/main" id="{C24BBE9F-0C6C-794C-ACD6-7ABD6FAA687F}"/>
+              </a:ext>
+            </a:extLst>
+          </p:cNvPr>
+          <p:cNvSpPr>
+            <a:spLocks noGrp="1"/>
+          </p:cNvSpPr>
+          <p:nvPr>
+            <p:ph type="title"/>
+          </p:nvPr>
+        </p:nvSpPr>
+        <p:spPr/>
+        <p:txBody>
+          <a:bodyPr/>
+          <a:lstStyle/>
+          <a:p>
+            <a:r>
+              <a:rPr lang="en-US" dirty="0"/>
+              <a:t>Generating Noise</a:t>
+            </a:r>
+          </a:p>
+        </p:txBody>
+      </p:sp>
+      <p:sp>
+        <p:nvSpPr>
+          <p:cNvPr id="3" name="Content Placeholder 2">
+            <a:extLst>
+              <a:ext uri="{FF2B5EF4-FFF2-40B4-BE49-F238E27FC236}">
+                <a16:creationId xmlns:a16="http://schemas.microsoft.com/office/drawing/2014/main" id="{A935E43E-6511-BB4F-9F22-25364C8E0615}"/>
+              </a:ext>
+            </a:extLst>
+          </p:cNvPr>
+          <p:cNvSpPr>
+            <a:spLocks noGrp="1"/>
+          </p:cNvSpPr>
+          <p:nvPr>
+            <p:ph idx="1"/>
+          </p:nvPr>
+        </p:nvSpPr>
+        <p:spPr/>
+        <p:txBody>
+          <a:bodyPr/>
+          <a:lstStyle/>
+          <a:p>
+            <a:r>
+              <a:rPr lang="en-US" dirty="0"/>
+              <a:t>Approach:</a:t>
+            </a:r>
+          </a:p>
+          <a:p>
+            <a:endParaRPr lang="en-US" dirty="0"/>
+          </a:p>
+          <a:p>
+            <a:pPr lvl="1"/>
+            <a:r>
+              <a:rPr lang="en-US" dirty="0"/>
+              <a:t>Need phase information to create a time series from NHNM/NLNM</a:t>
+            </a:r>
+          </a:p>
+          <a:p>
+            <a:pPr lvl="1"/>
+            <a:r>
+              <a:rPr lang="en-US" dirty="0"/>
+              <a:t>Get spectral amplitude A = sqrt(2 * PSD)</a:t>
+            </a:r>
+          </a:p>
+          <a:p>
+            <a:pPr lvl="1"/>
+            <a:r>
+              <a:rPr lang="en-US" dirty="0"/>
+              <a:t>Apply phase information via  Z[</a:t>
+            </a:r>
+            <a:r>
+              <a:rPr lang="en-US" dirty="0" err="1"/>
+              <a:t>i</a:t>
+            </a:r>
+            <a:r>
+              <a:rPr lang="en-US" dirty="0"/>
+              <a:t>] = A[</a:t>
+            </a:r>
+            <a:r>
+              <a:rPr lang="en-US" dirty="0" err="1"/>
+              <a:t>i</a:t>
+            </a:r>
+            <a:r>
+              <a:rPr lang="en-US" dirty="0"/>
+              <a:t>] * </a:t>
+            </a:r>
+            <a:r>
+              <a:rPr lang="en-US" dirty="0" err="1"/>
+              <a:t>np.exp</a:t>
+            </a:r>
+            <a:r>
+              <a:rPr lang="en-US" dirty="0"/>
+              <a:t>(</a:t>
+            </a:r>
+            <a:r>
+              <a:rPr lang="en-US" dirty="0" err="1"/>
+              <a:t>img</a:t>
+            </a:r>
+            <a:r>
+              <a:rPr lang="en-US" dirty="0"/>
+              <a:t> * phase[</a:t>
+            </a:r>
+            <a:r>
+              <a:rPr lang="en-US" dirty="0" err="1"/>
+              <a:t>i</a:t>
+            </a:r>
+            <a:r>
+              <a:rPr lang="en-US" dirty="0"/>
+              <a:t>])</a:t>
+            </a:r>
+          </a:p>
+          <a:p>
+            <a:pPr lvl="1"/>
+            <a:endParaRPr lang="en-US" dirty="0"/>
+          </a:p>
+        </p:txBody>
+      </p:sp>
+    </p:spTree>
+    <p:extLst>
+      <p:ext uri="{BB962C8B-B14F-4D97-AF65-F5344CB8AC3E}">
+        <p14:creationId xmlns:p14="http://schemas.microsoft.com/office/powerpoint/2010/main" val="4150555729"/>
+      </p:ext>
+    </p:extLst>
+  </p:cSld>
+  <p:clrMapOvr>
+    <a:masterClrMapping/>
+  </p:clrMapOvr>
+</p:sld>
+</file>
+
+<file path=ppt/slides/slide12.xml><?xml version="1.0" encoding="utf-8"?>
+<p:sld xmlns:a="http://schemas.openxmlformats.org/drawingml/2006/main" xmlns:r="http://schemas.openxmlformats.org/officeDocument/2006/relationships" xmlns:p="http://schemas.openxmlformats.org/presentationml/2006/main">
+  <p:cSld>
+    <p:bg>
+      <p:bgPr>
+        <a:solidFill>
+          <a:schemeClr val="bg2"/>
+        </a:solidFill>
+        <a:effectLst/>
+      </p:bgPr>
+    </p:bg>
+    <p:spTree>
+      <p:nvGrpSpPr>
+        <p:cNvPr id="1" name=""/>
+        <p:cNvGrpSpPr/>
+        <p:nvPr/>
+      </p:nvGrpSpPr>
+      <p:grpSpPr>
+        <a:xfrm>
+          <a:off x="0" y="0"/>
+          <a:ext cx="0" cy="0"/>
+          <a:chOff x="0" y="0"/>
+          <a:chExt cx="0" cy="0"/>
+        </a:xfrm>
+      </p:grpSpPr>
+      <p:sp>
+        <p:nvSpPr>
+          <p:cNvPr id="10" name="Rectangle 9">
+            <a:extLst>
+              <a:ext uri="{FF2B5EF4-FFF2-40B4-BE49-F238E27FC236}">
+                <a16:creationId xmlns:a16="http://schemas.microsoft.com/office/drawing/2014/main" id="{16C5FA50-8D52-4617-AF91-5C7B1C8352F1}"/>
+              </a:ext>
+              <a:ext uri="{C183D7F6-B498-43B3-948B-1728B52AA6E4}">
+                <adec:decorative xmlns:adec="http://schemas.microsoft.com/office/drawing/2017/decorative" val="1"/>
+              </a:ext>
+            </a:extLst>
+          </p:cNvPr>
+          <p:cNvSpPr>
+            <a:spLocks noGrp="1" noRot="1" noChangeAspect="1" noMove="1" noResize="1" noEditPoints="1" noAdjustHandles="1" noChangeArrowheads="1" noChangeShapeType="1" noTextEdit="1"/>
+          </p:cNvSpPr>
+          <p:nvPr>
+            <p:extLst>
+              <p:ext uri="{386F3935-93C4-4BCD-93E2-E3B085C9AB24}">
+                <p16:designElem xmlns:p16="http://schemas.microsoft.com/office/powerpoint/2015/main" val="1"/>
+              </p:ext>
+            </p:extLst>
+          </p:nvPr>
+        </p:nvSpPr>
+        <p:spPr>
+          <a:xfrm>
+            <a:off x="0" y="0"/>
+            <a:ext cx="12192000" cy="6858000"/>
+          </a:xfrm>
+          <a:prstGeom prst="rect">
+            <a:avLst/>
+          </a:prstGeom>
+          <a:solidFill>
+            <a:srgbClr val="767171"/>
+          </a:solidFill>
+          <a:ln>
+            <a:noFill/>
+          </a:ln>
+        </p:spPr>
+        <p:style>
+          <a:lnRef idx="2">
+            <a:schemeClr val="accent1">
+              <a:shade val="50000"/>
+            </a:schemeClr>
+          </a:lnRef>
+          <a:fillRef idx="1">
+            <a:schemeClr val="accent1"/>
+          </a:fillRef>
+          <a:effectRef idx="0">
+            <a:schemeClr val="accent1"/>
+          </a:effectRef>
+          <a:fontRef idx="minor">
+            <a:schemeClr val="lt1"/>
+          </a:fontRef>
+        </p:style>
+        <p:txBody>
+          <a:bodyPr rtlCol="0" anchor="ctr"/>
+          <a:lstStyle/>
+          <a:p>
+            <a:pPr algn="ctr"/>
+            <a:endParaRPr lang="en-US"/>
+          </a:p>
+        </p:txBody>
+      </p:sp>
+      <p:sp>
+        <p:nvSpPr>
+          <p:cNvPr id="2" name="Title 1">
+            <a:extLst>
+              <a:ext uri="{FF2B5EF4-FFF2-40B4-BE49-F238E27FC236}">
+                <a16:creationId xmlns:a16="http://schemas.microsoft.com/office/drawing/2014/main" id="{9D386DA1-1DD0-3344-9C26-FA32D7F39A77}"/>
+              </a:ext>
+            </a:extLst>
+          </p:cNvPr>
+          <p:cNvSpPr>
+            <a:spLocks noGrp="1"/>
+          </p:cNvSpPr>
+          <p:nvPr>
+            <p:ph type="title"/>
+          </p:nvPr>
+        </p:nvSpPr>
+        <p:spPr>
+          <a:xfrm>
+            <a:off x="9093496" y="618681"/>
+            <a:ext cx="2613872" cy="4794567"/>
+          </a:xfrm>
+        </p:spPr>
+        <p:txBody>
+          <a:bodyPr vert="horz" lIns="91440" tIns="45720" rIns="91440" bIns="45720" rtlCol="0" anchor="ctr">
+            <a:normAutofit/>
+          </a:bodyPr>
+          <a:lstStyle/>
+          <a:p>
+            <a:r>
+              <a:rPr lang="en-US" sz="3600">
+                <a:solidFill>
+                  <a:srgbClr val="FFFFFF"/>
+                </a:solidFill>
+              </a:rPr>
+              <a:t>Starting Models</a:t>
+            </a:r>
+          </a:p>
+        </p:txBody>
+      </p:sp>
+      <p:sp>
+        <p:nvSpPr>
+          <p:cNvPr id="12" name="Rounded Rectangle 9">
+            <a:extLst>
+              <a:ext uri="{FF2B5EF4-FFF2-40B4-BE49-F238E27FC236}">
+                <a16:creationId xmlns:a16="http://schemas.microsoft.com/office/drawing/2014/main" id="{E223798C-12AD-4B0C-A50C-D676347D67CF}"/>
+              </a:ext>
+              <a:ext uri="{C183D7F6-B498-43B3-948B-1728B52AA6E4}">
+                <adec:decorative xmlns:adec="http://schemas.microsoft.com/office/drawing/2017/decorative" val="1"/>
+              </a:ext>
+            </a:extLst>
+          </p:cNvPr>
+          <p:cNvSpPr>
+            <a:spLocks noGrp="1" noRot="1" noChangeAspect="1" noMove="1" noResize="1" noEditPoints="1" noAdjustHandles="1" noChangeArrowheads="1" noChangeShapeType="1" noTextEdit="1"/>
+          </p:cNvSpPr>
+          <p:nvPr>
+            <p:extLst>
+              <p:ext uri="{386F3935-93C4-4BCD-93E2-E3B085C9AB24}">
+                <p16:designElem xmlns:p16="http://schemas.microsoft.com/office/powerpoint/2015/main" val="1"/>
+              </p:ext>
+            </p:extLst>
+          </p:nvPr>
+        </p:nvSpPr>
+        <p:spPr>
+          <a:xfrm>
+            <a:off x="493354" y="484632"/>
+            <a:ext cx="8129016" cy="5724144"/>
+          </a:xfrm>
+          <a:prstGeom prst="roundRect">
+            <a:avLst>
+              <a:gd name="adj" fmla="val 0"/>
+            </a:avLst>
+          </a:prstGeom>
+          <a:solidFill>
+            <a:srgbClr val="FFFFFF"/>
+          </a:solidFill>
+          <a:ln w="9525">
+            <a:solidFill>
+              <a:srgbClr val="C8CACA"/>
+            </a:solidFill>
+          </a:ln>
+          <a:effectLst>
+            <a:outerShdw blurRad="57150" dist="19050" dir="5400000" algn="t" rotWithShape="0">
+              <a:prstClr val="black">
+                <a:alpha val="63000"/>
+              </a:prstClr>
+            </a:outerShdw>
+          </a:effectLst>
+        </p:spPr>
+        <p:style>
+          <a:lnRef idx="2">
+            <a:schemeClr val="accent1">
+              <a:shade val="50000"/>
+            </a:schemeClr>
+          </a:lnRef>
+          <a:fillRef idx="1">
+            <a:schemeClr val="accent1"/>
+          </a:fillRef>
+          <a:effectRef idx="0">
+            <a:schemeClr val="accent1"/>
+          </a:effectRef>
+          <a:fontRef idx="minor">
+            <a:schemeClr val="lt1"/>
+          </a:fontRef>
+        </p:style>
+        <p:txBody>
+          <a:bodyPr rtlCol="0" anchor="ctr"/>
+          <a:lstStyle/>
+          <a:p>
+            <a:pPr algn="ctr"/>
+            <a:endParaRPr lang="en-US"/>
+          </a:p>
+        </p:txBody>
+      </p:sp>
+      <p:pic>
+        <p:nvPicPr>
+          <p:cNvPr id="5" name="Content Placeholder 4" descr="Chart, line chart&#10;&#10;Description automatically generated">
+            <a:extLst>
+              <a:ext uri="{FF2B5EF4-FFF2-40B4-BE49-F238E27FC236}">
+                <a16:creationId xmlns:a16="http://schemas.microsoft.com/office/drawing/2014/main" id="{9B4A1A75-267B-404E-BEB1-5CD3DF00B541}"/>
+              </a:ext>
+            </a:extLst>
+          </p:cNvPr>
+          <p:cNvPicPr>
+            <a:picLocks noGrp="1" noChangeAspect="1"/>
+          </p:cNvPicPr>
+          <p:nvPr>
+            <p:ph idx="1"/>
+          </p:nvPr>
+        </p:nvPicPr>
+        <p:blipFill rotWithShape="1">
+          <a:blip r:embed="rId2"/>
+          <a:srcRect l="559" r="1" b="1"/>
+          <a:stretch/>
+        </p:blipFill>
+        <p:spPr>
+          <a:xfrm>
+            <a:off x="976251" y="942538"/>
+            <a:ext cx="7163222" cy="4808332"/>
+          </a:xfrm>
+          <a:prstGeom prst="rect">
+            <a:avLst/>
+          </a:prstGeom>
+          <a:effectLst/>
+        </p:spPr>
+      </p:pic>
+    </p:spTree>
+    <p:extLst>
+      <p:ext uri="{BB962C8B-B14F-4D97-AF65-F5344CB8AC3E}">
+        <p14:creationId xmlns:p14="http://schemas.microsoft.com/office/powerpoint/2010/main" val="3877925177"/>
+      </p:ext>
+    </p:extLst>
+  </p:cSld>
+  <p:clrMapOvr>
+    <a:masterClrMapping/>
+  </p:clrMapOvr>
+</p:sld>
+</file>
+
+<file path=ppt/slides/slide13.xml><?xml version="1.0" encoding="utf-8"?>
+<p:sld xmlns:a="http://schemas.openxmlformats.org/drawingml/2006/main" xmlns:r="http://schemas.openxmlformats.org/officeDocument/2006/relationships" xmlns:p="http://schemas.openxmlformats.org/presentationml/2006/main">
+  <p:cSld>
+    <p:bg>
+      <p:bgPr>
+        <a:solidFill>
+          <a:schemeClr val="bg1">
+            <a:tint val="95000"/>
+            <a:satMod val="170000"/>
+          </a:schemeClr>
+        </a:solidFill>
+        <a:effectLst/>
+      </p:bgPr>
+    </p:bg>
+    <p:spTree>
+      <p:nvGrpSpPr>
+        <p:cNvPr id="1" name=""/>
+        <p:cNvGrpSpPr/>
+        <p:nvPr/>
+      </p:nvGrpSpPr>
+      <p:grpSpPr>
+        <a:xfrm>
+          <a:off x="0" y="0"/>
+          <a:ext cx="0" cy="0"/>
+          <a:chOff x="0" y="0"/>
+          <a:chExt cx="0" cy="0"/>
+        </a:xfrm>
+      </p:grpSpPr>
+      <p:sp>
+        <p:nvSpPr>
+          <p:cNvPr id="2" name="Title 1">
+            <a:extLst>
+              <a:ext uri="{FF2B5EF4-FFF2-40B4-BE49-F238E27FC236}">
+                <a16:creationId xmlns:a16="http://schemas.microsoft.com/office/drawing/2014/main" id="{19B5EE19-B6F3-2D48-82B9-7C6CF6630484}"/>
+              </a:ext>
+            </a:extLst>
+          </p:cNvPr>
+          <p:cNvSpPr>
+            <a:spLocks noGrp="1"/>
+          </p:cNvSpPr>
+          <p:nvPr>
+            <p:ph type="title"/>
+          </p:nvPr>
+        </p:nvSpPr>
+        <p:spPr>
+          <a:xfrm>
+            <a:off x="714756" y="321211"/>
+            <a:ext cx="10762488" cy="1207008"/>
+          </a:xfrm>
+        </p:spPr>
+        <p:txBody>
+          <a:bodyPr vert="horz" lIns="91440" tIns="45720" rIns="91440" bIns="45720" rtlCol="0" anchor="b">
+            <a:normAutofit/>
+          </a:bodyPr>
+          <a:lstStyle/>
+          <a:p>
+            <a:pPr algn="ctr"/>
+            <a:r>
+              <a:rPr lang="en-US" sz="6000" kern="1200" dirty="0">
+                <a:solidFill>
+                  <a:schemeClr val="tx1"/>
+                </a:solidFill>
+                <a:latin typeface="+mj-lt"/>
+                <a:ea typeface="+mj-ea"/>
+                <a:cs typeface="+mj-cs"/>
+              </a:rPr>
+              <a:t>For each point, get random phase</a:t>
+            </a:r>
+          </a:p>
+        </p:txBody>
+      </p:sp>
+      <p:pic>
+        <p:nvPicPr>
+          <p:cNvPr id="5" name="Content Placeholder 4" descr="Chart, scatter chart&#10;&#10;Description automatically generated">
+            <a:extLst>
+              <a:ext uri="{FF2B5EF4-FFF2-40B4-BE49-F238E27FC236}">
+                <a16:creationId xmlns:a16="http://schemas.microsoft.com/office/drawing/2014/main" id="{32F75860-3D33-F24F-9617-1C0790703454}"/>
+              </a:ext>
+            </a:extLst>
+          </p:cNvPr>
+          <p:cNvPicPr>
+            <a:picLocks noGrp="1" noChangeAspect="1"/>
+          </p:cNvPicPr>
+          <p:nvPr>
+            <p:ph idx="1"/>
+          </p:nvPr>
+        </p:nvPicPr>
+        <p:blipFill rotWithShape="1">
+          <a:blip r:embed="rId2"/>
+          <a:srcRect l="86" r="1" b="1"/>
+          <a:stretch/>
+        </p:blipFill>
+        <p:spPr>
+          <a:xfrm>
+            <a:off x="609600" y="2423680"/>
+            <a:ext cx="5212080" cy="3856948"/>
+          </a:xfrm>
+          <a:prstGeom prst="rect">
+            <a:avLst/>
+          </a:prstGeom>
+        </p:spPr>
+      </p:pic>
+      <p:cxnSp>
+        <p:nvCxnSpPr>
+          <p:cNvPr id="12" name="Straight Connector 11">
+            <a:extLst>
+              <a:ext uri="{FF2B5EF4-FFF2-40B4-BE49-F238E27FC236}">
+                <a16:creationId xmlns:a16="http://schemas.microsoft.com/office/drawing/2014/main" id="{B6375111-306C-49EA-9DD1-79A2ED78FA30}"/>
+              </a:ext>
+              <a:ext uri="{C183D7F6-B498-43B3-948B-1728B52AA6E4}">
+                <adec:decorative xmlns:adec="http://schemas.microsoft.com/office/drawing/2017/decorative" val="1"/>
+              </a:ext>
+            </a:extLst>
+          </p:cNvPr>
+          <p:cNvCxnSpPr>
+            <a:cxnSpLocks noGrp="1" noRot="1" noChangeAspect="1" noMove="1" noResize="1" noEditPoints="1" noAdjustHandles="1" noChangeArrowheads="1" noChangeShapeType="1"/>
+          </p:cNvCxnSpPr>
+          <p:nvPr>
+            <p:extLst>
+              <p:ext uri="{386F3935-93C4-4BCD-93E2-E3B085C9AB24}">
+                <p16:designElem xmlns:p16="http://schemas.microsoft.com/office/powerpoint/2015/main" val="1"/>
+              </p:ext>
+            </p:extLst>
+          </p:nvPr>
+        </p:nvCxnSpPr>
+        <p:spPr>
+          <a:xfrm>
+            <a:off x="6096000" y="3354776"/>
+            <a:ext cx="0" cy="2120900"/>
+          </a:xfrm>
+          <a:prstGeom prst="line">
+            <a:avLst/>
+          </a:prstGeom>
+          <a:ln w="19050">
+            <a:solidFill>
+              <a:schemeClr val="tx1">
+                <a:lumMod val="85000"/>
+                <a:lumOff val="15000"/>
+              </a:schemeClr>
+            </a:solidFill>
+          </a:ln>
+        </p:spPr>
+        <p:style>
+          <a:lnRef idx="1">
+            <a:schemeClr val="accent1"/>
+          </a:lnRef>
+          <a:fillRef idx="0">
+            <a:schemeClr val="accent1"/>
+          </a:fillRef>
+          <a:effectRef idx="0">
+            <a:schemeClr val="accent1"/>
+          </a:effectRef>
+          <a:fontRef idx="minor">
+            <a:schemeClr val="tx1"/>
+          </a:fontRef>
+        </p:style>
+      </p:cxnSp>
+      <p:pic>
+        <p:nvPicPr>
+          <p:cNvPr id="7" name="Picture 6" descr="Chart, histogram&#10;&#10;Description automatically generated">
+            <a:extLst>
+              <a:ext uri="{FF2B5EF4-FFF2-40B4-BE49-F238E27FC236}">
+                <a16:creationId xmlns:a16="http://schemas.microsoft.com/office/drawing/2014/main" id="{3E3D8D1D-2CC7-164D-AE54-207A397C7EB4}"/>
+              </a:ext>
+            </a:extLst>
+          </p:cNvPr>
+          <p:cNvPicPr>
+            <a:picLocks noChangeAspect="1"/>
+          </p:cNvPicPr>
+          <p:nvPr/>
+        </p:nvPicPr>
+        <p:blipFill rotWithShape="1">
+          <a:blip r:embed="rId3"/>
+          <a:srcRect l="1672" r="-1" b="-1"/>
+          <a:stretch/>
+        </p:blipFill>
+        <p:spPr>
+          <a:xfrm>
+            <a:off x="6370320" y="2423040"/>
+            <a:ext cx="5212080" cy="3857568"/>
+          </a:xfrm>
+          <a:prstGeom prst="rect">
+            <a:avLst/>
+          </a:prstGeom>
+        </p:spPr>
+      </p:pic>
+    </p:spTree>
+    <p:extLst>
+      <p:ext uri="{BB962C8B-B14F-4D97-AF65-F5344CB8AC3E}">
+        <p14:creationId xmlns:p14="http://schemas.microsoft.com/office/powerpoint/2010/main" val="4147081449"/>
+      </p:ext>
+    </p:extLst>
+  </p:cSld>
+  <p:clrMapOvr>
+    <a:overrideClrMapping bg1="dk1" tx1="lt1" bg2="dk2" tx2="lt2" accent1="accent1" accent2="accent2" accent3="accent3" accent4="accent4" accent5="accent5" accent6="accent6" hlink="hlink" folHlink="folHlink"/>
+  </p:clrMapOvr>
+</p:sld>
+</file>
+
+<file path=ppt/slides/slide14.xml><?xml version="1.0" encoding="utf-8"?>
+<p:sld xmlns:a="http://schemas.openxmlformats.org/drawingml/2006/main" xmlns:r="http://schemas.openxmlformats.org/officeDocument/2006/relationships" xmlns:p="http://schemas.openxmlformats.org/presentationml/2006/main">
+  <p:cSld>
+    <p:bg>
+      <p:bgPr>
+        <a:solidFill>
+          <a:schemeClr val="bg2"/>
+        </a:solidFill>
+        <a:effectLst/>
+      </p:bgPr>
+    </p:bg>
+    <p:spTree>
+      <p:nvGrpSpPr>
+        <p:cNvPr id="1" name=""/>
+        <p:cNvGrpSpPr/>
+        <p:nvPr/>
+      </p:nvGrpSpPr>
+      <p:grpSpPr>
+        <a:xfrm>
+          <a:off x="0" y="0"/>
+          <a:ext cx="0" cy="0"/>
+          <a:chOff x="0" y="0"/>
+          <a:chExt cx="0" cy="0"/>
+        </a:xfrm>
+      </p:grpSpPr>
+      <p:sp>
+        <p:nvSpPr>
+          <p:cNvPr id="10" name="Rectangle 9">
+            <a:extLst>
+              <a:ext uri="{FF2B5EF4-FFF2-40B4-BE49-F238E27FC236}">
+                <a16:creationId xmlns:a16="http://schemas.microsoft.com/office/drawing/2014/main" id="{BEE73255-8084-4DF9-BB0B-15EAC92E2CB9}"/>
+              </a:ext>
+              <a:ext uri="{C183D7F6-B498-43B3-948B-1728B52AA6E4}">
+                <adec:decorative xmlns:adec="http://schemas.microsoft.com/office/drawing/2017/decorative" val="1"/>
+              </a:ext>
+            </a:extLst>
+          </p:cNvPr>
+          <p:cNvSpPr>
+            <a:spLocks noGrp="1" noRot="1" noChangeAspect="1" noMove="1" noResize="1" noEditPoints="1" noAdjustHandles="1" noChangeArrowheads="1" noChangeShapeType="1" noTextEdit="1"/>
+          </p:cNvSpPr>
+          <p:nvPr>
+            <p:extLst>
+              <p:ext uri="{386F3935-93C4-4BCD-93E2-E3B085C9AB24}">
+                <p16:designElem xmlns:p16="http://schemas.microsoft.com/office/powerpoint/2015/main" val="1"/>
+              </p:ext>
+            </p:extLst>
+          </p:nvPr>
+        </p:nvSpPr>
+        <p:spPr>
+          <a:xfrm>
+            <a:off x="0" y="0"/>
+            <a:ext cx="12192000" cy="6858000"/>
+          </a:xfrm>
+          <a:prstGeom prst="rect">
+            <a:avLst/>
+          </a:prstGeom>
+          <a:solidFill>
+            <a:srgbClr val="C8CACA"/>
+          </a:solidFill>
+          <a:ln>
+            <a:noFill/>
+          </a:ln>
+        </p:spPr>
+        <p:style>
+          <a:lnRef idx="2">
+            <a:schemeClr val="accent1">
+              <a:shade val="50000"/>
+            </a:schemeClr>
+          </a:lnRef>
+          <a:fillRef idx="1">
+            <a:schemeClr val="accent1"/>
+          </a:fillRef>
+          <a:effectRef idx="0">
+            <a:schemeClr val="accent1"/>
+          </a:effectRef>
+          <a:fontRef idx="minor">
+            <a:schemeClr val="lt1"/>
+          </a:fontRef>
+        </p:style>
+        <p:txBody>
+          <a:bodyPr rtlCol="0" anchor="ctr"/>
+          <a:lstStyle/>
+          <a:p>
+            <a:pPr algn="ctr"/>
+            <a:endParaRPr lang="en-US"/>
+          </a:p>
+        </p:txBody>
+      </p:sp>
+      <p:sp>
+        <p:nvSpPr>
+          <p:cNvPr id="2" name="Title 1">
+            <a:extLst>
+              <a:ext uri="{FF2B5EF4-FFF2-40B4-BE49-F238E27FC236}">
+                <a16:creationId xmlns:a16="http://schemas.microsoft.com/office/drawing/2014/main" id="{2EE597E3-73B9-614E-ACA3-A180790A82EE}"/>
+              </a:ext>
+            </a:extLst>
+          </p:cNvPr>
+          <p:cNvSpPr>
+            <a:spLocks noGrp="1"/>
+          </p:cNvSpPr>
+          <p:nvPr>
+            <p:ph type="title"/>
+          </p:nvPr>
+        </p:nvSpPr>
+        <p:spPr>
+          <a:xfrm>
+            <a:off x="603938" y="640081"/>
+            <a:ext cx="2608655" cy="5257799"/>
+          </a:xfrm>
+        </p:spPr>
+        <p:txBody>
+          <a:bodyPr vert="horz" lIns="91440" tIns="45720" rIns="91440" bIns="45720" rtlCol="0" anchor="ctr">
+            <a:normAutofit/>
+          </a:bodyPr>
+          <a:lstStyle/>
+          <a:p>
+            <a:r>
+              <a:rPr lang="en-US" sz="3600" dirty="0">
+                <a:solidFill>
+                  <a:srgbClr val="2C2C2C"/>
+                </a:solidFill>
+              </a:rPr>
+              <a:t>Check spectral amplitude – (after converting from dB and using sqrt())</a:t>
+            </a:r>
+          </a:p>
+        </p:txBody>
+      </p:sp>
+      <p:sp>
+        <p:nvSpPr>
+          <p:cNvPr id="12" name="Rounded Rectangle 9">
+            <a:extLst>
+              <a:ext uri="{FF2B5EF4-FFF2-40B4-BE49-F238E27FC236}">
+                <a16:creationId xmlns:a16="http://schemas.microsoft.com/office/drawing/2014/main" id="{67048353-8981-459A-9BC6-9711CE462E06}"/>
+              </a:ext>
+              <a:ext uri="{C183D7F6-B498-43B3-948B-1728B52AA6E4}">
+                <adec:decorative xmlns:adec="http://schemas.microsoft.com/office/drawing/2017/decorative" val="1"/>
+              </a:ext>
+            </a:extLst>
+          </p:cNvPr>
+          <p:cNvSpPr>
+            <a:spLocks noGrp="1" noRot="1" noChangeAspect="1" noMove="1" noResize="1" noEditPoints="1" noAdjustHandles="1" noChangeArrowheads="1" noChangeShapeType="1" noTextEdit="1"/>
+          </p:cNvSpPr>
+          <p:nvPr>
+            <p:extLst>
+              <p:ext uri="{386F3935-93C4-4BCD-93E2-E3B085C9AB24}">
+                <p16:designElem xmlns:p16="http://schemas.microsoft.com/office/powerpoint/2015/main" val="1"/>
+              </p:ext>
+            </p:extLst>
+          </p:nvPr>
+        </p:nvSpPr>
+        <p:spPr>
+          <a:xfrm>
+            <a:off x="3580067" y="484632"/>
+            <a:ext cx="8129016" cy="5724144"/>
+          </a:xfrm>
+          <a:prstGeom prst="roundRect">
+            <a:avLst>
+              <a:gd name="adj" fmla="val 0"/>
+            </a:avLst>
+          </a:prstGeom>
+          <a:solidFill>
+            <a:srgbClr val="FFFFFF"/>
+          </a:solidFill>
+          <a:ln w="9525">
+            <a:solidFill>
+              <a:srgbClr val="C8CACA"/>
+            </a:solidFill>
+          </a:ln>
+          <a:effectLst>
+            <a:outerShdw blurRad="57150" dist="19050" dir="5400000" algn="t" rotWithShape="0">
+              <a:prstClr val="black">
+                <a:alpha val="63000"/>
+              </a:prstClr>
+            </a:outerShdw>
+          </a:effectLst>
+        </p:spPr>
+        <p:style>
+          <a:lnRef idx="2">
+            <a:schemeClr val="accent1">
+              <a:shade val="50000"/>
+            </a:schemeClr>
+          </a:lnRef>
+          <a:fillRef idx="1">
+            <a:schemeClr val="accent1"/>
+          </a:fillRef>
+          <a:effectRef idx="0">
+            <a:schemeClr val="accent1"/>
+          </a:effectRef>
+          <a:fontRef idx="minor">
+            <a:schemeClr val="lt1"/>
+          </a:fontRef>
+        </p:style>
+        <p:txBody>
+          <a:bodyPr rtlCol="0" anchor="ctr"/>
+          <a:lstStyle/>
+          <a:p>
+            <a:pPr algn="ctr"/>
+            <a:endParaRPr lang="en-US"/>
+          </a:p>
+        </p:txBody>
+      </p:sp>
+      <p:pic>
+        <p:nvPicPr>
+          <p:cNvPr id="5" name="Content Placeholder 4" descr="Chart, line chart&#10;&#10;Description automatically generated">
+            <a:extLst>
+              <a:ext uri="{FF2B5EF4-FFF2-40B4-BE49-F238E27FC236}">
+                <a16:creationId xmlns:a16="http://schemas.microsoft.com/office/drawing/2014/main" id="{75130E93-8D20-9546-AD8C-C0B801C6339C}"/>
+              </a:ext>
+            </a:extLst>
+          </p:cNvPr>
+          <p:cNvPicPr>
+            <a:picLocks noGrp="1" noChangeAspect="1"/>
+          </p:cNvPicPr>
+          <p:nvPr>
+            <p:ph idx="1"/>
+          </p:nvPr>
+        </p:nvPicPr>
+        <p:blipFill rotWithShape="1">
+          <a:blip r:embed="rId2"/>
+          <a:srcRect t="2426" r="1" b="2441"/>
+          <a:stretch/>
+        </p:blipFill>
+        <p:spPr>
+          <a:xfrm>
+            <a:off x="4062964" y="942538"/>
+            <a:ext cx="7163222" cy="4808332"/>
+          </a:xfrm>
+          <a:prstGeom prst="rect">
+            <a:avLst/>
+          </a:prstGeom>
+          <a:effectLst/>
+        </p:spPr>
+      </p:pic>
+    </p:spTree>
+    <p:extLst>
+      <p:ext uri="{BB962C8B-B14F-4D97-AF65-F5344CB8AC3E}">
+        <p14:creationId xmlns:p14="http://schemas.microsoft.com/office/powerpoint/2010/main" val="510497373"/>
+      </p:ext>
+    </p:extLst>
+  </p:cSld>
+  <p:clrMapOvr>
+    <a:masterClrMapping/>
+  </p:clrMapOvr>
+</p:sld>
+</file>
+
+<file path=ppt/slides/slide15.xml><?xml version="1.0" encoding="utf-8"?>
+<p:sld xmlns:a="http://schemas.openxmlformats.org/drawingml/2006/main" xmlns:r="http://schemas.openxmlformats.org/officeDocument/2006/relationships" xmlns:p="http://schemas.openxmlformats.org/presentationml/2006/main">
+  <p:cSld>
+    <p:bg>
+      <p:bgPr>
+        <a:solidFill>
+          <a:schemeClr val="bg2"/>
+        </a:solidFill>
+        <a:effectLst/>
+      </p:bgPr>
+    </p:bg>
+    <p:spTree>
+      <p:nvGrpSpPr>
+        <p:cNvPr id="1" name=""/>
+        <p:cNvGrpSpPr/>
+        <p:nvPr/>
+      </p:nvGrpSpPr>
+      <p:grpSpPr>
+        <a:xfrm>
+          <a:off x="0" y="0"/>
+          <a:ext cx="0" cy="0"/>
+          <a:chOff x="0" y="0"/>
+          <a:chExt cx="0" cy="0"/>
+        </a:xfrm>
+      </p:grpSpPr>
+      <p:sp>
+        <p:nvSpPr>
+          <p:cNvPr id="10" name="Rectangle 9">
+            <a:extLst>
+              <a:ext uri="{FF2B5EF4-FFF2-40B4-BE49-F238E27FC236}">
+                <a16:creationId xmlns:a16="http://schemas.microsoft.com/office/drawing/2014/main" id="{16C5FA50-8D52-4617-AF91-5C7B1C8352F1}"/>
+              </a:ext>
+              <a:ext uri="{C183D7F6-B498-43B3-948B-1728B52AA6E4}">
+                <adec:decorative xmlns:adec="http://schemas.microsoft.com/office/drawing/2017/decorative" val="1"/>
+              </a:ext>
+            </a:extLst>
+          </p:cNvPr>
+          <p:cNvSpPr>
+            <a:spLocks noGrp="1" noRot="1" noChangeAspect="1" noMove="1" noResize="1" noEditPoints="1" noAdjustHandles="1" noChangeArrowheads="1" noChangeShapeType="1" noTextEdit="1"/>
+          </p:cNvSpPr>
+          <p:nvPr>
+            <p:extLst>
+              <p:ext uri="{386F3935-93C4-4BCD-93E2-E3B085C9AB24}">
+                <p16:designElem xmlns:p16="http://schemas.microsoft.com/office/powerpoint/2015/main" val="1"/>
+              </p:ext>
+            </p:extLst>
+          </p:nvPr>
+        </p:nvSpPr>
+        <p:spPr>
+          <a:xfrm>
+            <a:off x="0" y="0"/>
+            <a:ext cx="12192000" cy="6858000"/>
+          </a:xfrm>
+          <a:prstGeom prst="rect">
+            <a:avLst/>
+          </a:prstGeom>
+          <a:solidFill>
+            <a:srgbClr val="767171"/>
+          </a:solidFill>
+          <a:ln>
+            <a:noFill/>
+          </a:ln>
+        </p:spPr>
+        <p:style>
+          <a:lnRef idx="2">
+            <a:schemeClr val="accent1">
+              <a:shade val="50000"/>
+            </a:schemeClr>
+          </a:lnRef>
+          <a:fillRef idx="1">
+            <a:schemeClr val="accent1"/>
+          </a:fillRef>
+          <a:effectRef idx="0">
+            <a:schemeClr val="accent1"/>
+          </a:effectRef>
+          <a:fontRef idx="minor">
+            <a:schemeClr val="lt1"/>
+          </a:fontRef>
+        </p:style>
+        <p:txBody>
+          <a:bodyPr rtlCol="0" anchor="ctr"/>
+          <a:lstStyle/>
+          <a:p>
+            <a:pPr algn="ctr"/>
+            <a:endParaRPr lang="en-US"/>
+          </a:p>
+        </p:txBody>
+      </p:sp>
+      <p:sp>
+        <p:nvSpPr>
+          <p:cNvPr id="2" name="Title 1">
+            <a:extLst>
+              <a:ext uri="{FF2B5EF4-FFF2-40B4-BE49-F238E27FC236}">
+                <a16:creationId xmlns:a16="http://schemas.microsoft.com/office/drawing/2014/main" id="{C7944535-11C7-1E4E-AB6A-FC5638B2826B}"/>
+              </a:ext>
+            </a:extLst>
+          </p:cNvPr>
+          <p:cNvSpPr>
+            <a:spLocks noGrp="1"/>
+          </p:cNvSpPr>
+          <p:nvPr>
+            <p:ph type="title"/>
+          </p:nvPr>
+        </p:nvSpPr>
+        <p:spPr>
+          <a:xfrm>
+            <a:off x="9093496" y="618681"/>
+            <a:ext cx="2613872" cy="4794567"/>
+          </a:xfrm>
+        </p:spPr>
+        <p:txBody>
+          <a:bodyPr vert="horz" lIns="91440" tIns="45720" rIns="91440" bIns="45720" rtlCol="0" anchor="ctr">
+            <a:normAutofit/>
+          </a:bodyPr>
+          <a:lstStyle/>
+          <a:p>
+            <a:r>
+              <a:rPr lang="en-US" sz="3600">
+                <a:solidFill>
+                  <a:srgbClr val="FFFFFF"/>
+                </a:solidFill>
+              </a:rPr>
+              <a:t>Take iFFT of signal in freq. domain with phase added </a:t>
+            </a:r>
+          </a:p>
+        </p:txBody>
+      </p:sp>
+      <p:sp>
+        <p:nvSpPr>
+          <p:cNvPr id="12" name="Rounded Rectangle 9">
+            <a:extLst>
+              <a:ext uri="{FF2B5EF4-FFF2-40B4-BE49-F238E27FC236}">
+                <a16:creationId xmlns:a16="http://schemas.microsoft.com/office/drawing/2014/main" id="{E223798C-12AD-4B0C-A50C-D676347D67CF}"/>
+              </a:ext>
+              <a:ext uri="{C183D7F6-B498-43B3-948B-1728B52AA6E4}">
+                <adec:decorative xmlns:adec="http://schemas.microsoft.com/office/drawing/2017/decorative" val="1"/>
+              </a:ext>
+            </a:extLst>
+          </p:cNvPr>
+          <p:cNvSpPr>
+            <a:spLocks noGrp="1" noRot="1" noChangeAspect="1" noMove="1" noResize="1" noEditPoints="1" noAdjustHandles="1" noChangeArrowheads="1" noChangeShapeType="1" noTextEdit="1"/>
+          </p:cNvSpPr>
+          <p:nvPr>
+            <p:extLst>
+              <p:ext uri="{386F3935-93C4-4BCD-93E2-E3B085C9AB24}">
+                <p16:designElem xmlns:p16="http://schemas.microsoft.com/office/powerpoint/2015/main" val="1"/>
+              </p:ext>
+            </p:extLst>
+          </p:nvPr>
+        </p:nvSpPr>
+        <p:spPr>
+          <a:xfrm>
+            <a:off x="493354" y="484632"/>
+            <a:ext cx="8129016" cy="5724144"/>
+          </a:xfrm>
+          <a:prstGeom prst="roundRect">
+            <a:avLst>
+              <a:gd name="adj" fmla="val 0"/>
+            </a:avLst>
+          </a:prstGeom>
+          <a:solidFill>
+            <a:srgbClr val="FFFFFF"/>
+          </a:solidFill>
+          <a:ln w="9525">
+            <a:solidFill>
+              <a:srgbClr val="C8CACA"/>
+            </a:solidFill>
+          </a:ln>
+          <a:effectLst>
+            <a:outerShdw blurRad="57150" dist="19050" dir="5400000" algn="t" rotWithShape="0">
+              <a:prstClr val="black">
+                <a:alpha val="63000"/>
+              </a:prstClr>
+            </a:outerShdw>
+          </a:effectLst>
+        </p:spPr>
+        <p:style>
+          <a:lnRef idx="2">
+            <a:schemeClr val="accent1">
+              <a:shade val="50000"/>
+            </a:schemeClr>
+          </a:lnRef>
+          <a:fillRef idx="1">
+            <a:schemeClr val="accent1"/>
+          </a:fillRef>
+          <a:effectRef idx="0">
+            <a:schemeClr val="accent1"/>
+          </a:effectRef>
+          <a:fontRef idx="minor">
+            <a:schemeClr val="lt1"/>
+          </a:fontRef>
+        </p:style>
+        <p:txBody>
+          <a:bodyPr rtlCol="0" anchor="ctr"/>
+          <a:lstStyle/>
+          <a:p>
+            <a:pPr algn="ctr"/>
+            <a:endParaRPr lang="en-US"/>
+          </a:p>
+        </p:txBody>
+      </p:sp>
+      <p:pic>
+        <p:nvPicPr>
+          <p:cNvPr id="5" name="Content Placeholder 4" descr="Chart, line chart&#10;&#10;Description automatically generated">
+            <a:extLst>
+              <a:ext uri="{FF2B5EF4-FFF2-40B4-BE49-F238E27FC236}">
+                <a16:creationId xmlns:a16="http://schemas.microsoft.com/office/drawing/2014/main" id="{9502AC2F-E249-7646-B451-CE4590D3BA66}"/>
+              </a:ext>
+            </a:extLst>
+          </p:cNvPr>
+          <p:cNvPicPr>
+            <a:picLocks noGrp="1" noChangeAspect="1"/>
+          </p:cNvPicPr>
+          <p:nvPr>
+            <p:ph idx="1"/>
+          </p:nvPr>
+        </p:nvPicPr>
+        <p:blipFill rotWithShape="1">
+          <a:blip r:embed="rId2"/>
+          <a:srcRect t="1877" r="1" b="2990"/>
+          <a:stretch/>
+        </p:blipFill>
+        <p:spPr>
+          <a:xfrm>
+            <a:off x="976251" y="942538"/>
+            <a:ext cx="7163222" cy="4808332"/>
+          </a:xfrm>
+          <a:prstGeom prst="rect">
+            <a:avLst/>
+          </a:prstGeom>
+          <a:effectLst/>
+        </p:spPr>
+      </p:pic>
+    </p:spTree>
+    <p:extLst>
+      <p:ext uri="{BB962C8B-B14F-4D97-AF65-F5344CB8AC3E}">
+        <p14:creationId xmlns:p14="http://schemas.microsoft.com/office/powerpoint/2010/main" val="372120638"/>
       </p:ext>
     </p:extLst>
   </p:cSld>

</xml_diff>